<commit_message>
consertando alguns pequenos erros de digitação na aula 2
</commit_message>
<xml_diff>
--- a/02 - intro/02 - a vida dos dados.pptx
+++ b/02 - intro/02 - a vida dos dados.pptx
@@ -136,7 +136,7 @@
   </p:defaultTextStyle>
   <p:extLst>
     <p:ext uri="{EFAFB233-063F-42B5-8137-9DF3F51BA10A}">
-      <p15:sldGuideLst xmlns:p15="http://schemas.microsoft.com/office/powerpoint/2012/main">
+      <p15:sldGuideLst xmlns:p15="http://schemas.microsoft.com/office/powerpoint/2012/main" xmlns="">
         <p15:guide id="1" orient="horz" pos="2160">
           <p15:clr>
             <a:srgbClr val="A4A3A4"/>
@@ -235,7 +235,7 @@
           <a:p>
             <a:fld id="{D77F9B3A-7A3F-3443-96C5-786D52DFBE7B}" type="datetimeFigureOut">
               <a:rPr lang="en-US" smtClean="0"/>
-              <a:t>8/15/2018</a:t>
+              <a:t>16/08/18</a:t>
             </a:fld>
             <a:endParaRPr lang="en-US"/>
           </a:p>
@@ -394,7 +394,7 @@
           <a:p>
             <a:fld id="{18117EBA-18FA-504E-AE64-70258D2045F8}" type="slidenum">
               <a:rPr lang="en-US" smtClean="0"/>
-              <a:t>‹nº›</a:t>
+              <a:t>‹#›</a:t>
             </a:fld>
             <a:endParaRPr lang="en-US"/>
           </a:p>
@@ -852,7 +852,7 @@
           <a:p>
             <a:fld id="{767C2E1B-A92C-A84A-BF40-233C804452B8}" type="datetimeFigureOut">
               <a:rPr lang="en-US" smtClean="0"/>
-              <a:t>8/15/2018</a:t>
+              <a:t>16/08/18</a:t>
             </a:fld>
             <a:endParaRPr lang="en-US"/>
           </a:p>
@@ -894,7 +894,7 @@
           <a:p>
             <a:fld id="{05D66809-10F8-ED4F-BF8F-2BAC7CA4D030}" type="slidenum">
               <a:rPr lang="en-US" smtClean="0"/>
-              <a:t>‹nº›</a:t>
+              <a:t>‹#›</a:t>
             </a:fld>
             <a:endParaRPr lang="en-US"/>
           </a:p>
@@ -1022,7 +1022,7 @@
           <a:p>
             <a:fld id="{767C2E1B-A92C-A84A-BF40-233C804452B8}" type="datetimeFigureOut">
               <a:rPr lang="en-US" smtClean="0"/>
-              <a:t>8/15/2018</a:t>
+              <a:t>16/08/18</a:t>
             </a:fld>
             <a:endParaRPr lang="en-US"/>
           </a:p>
@@ -1064,7 +1064,7 @@
           <a:p>
             <a:fld id="{05D66809-10F8-ED4F-BF8F-2BAC7CA4D030}" type="slidenum">
               <a:rPr lang="en-US" smtClean="0"/>
-              <a:t>‹nº›</a:t>
+              <a:t>‹#›</a:t>
             </a:fld>
             <a:endParaRPr lang="en-US"/>
           </a:p>
@@ -1202,7 +1202,7 @@
           <a:p>
             <a:fld id="{767C2E1B-A92C-A84A-BF40-233C804452B8}" type="datetimeFigureOut">
               <a:rPr lang="en-US" smtClean="0"/>
-              <a:t>8/15/2018</a:t>
+              <a:t>16/08/18</a:t>
             </a:fld>
             <a:endParaRPr lang="en-US"/>
           </a:p>
@@ -1244,7 +1244,7 @@
           <a:p>
             <a:fld id="{05D66809-10F8-ED4F-BF8F-2BAC7CA4D030}" type="slidenum">
               <a:rPr lang="en-US" smtClean="0"/>
-              <a:t>‹nº›</a:t>
+              <a:t>‹#›</a:t>
             </a:fld>
             <a:endParaRPr lang="en-US"/>
           </a:p>
@@ -1372,7 +1372,7 @@
           <a:p>
             <a:fld id="{767C2E1B-A92C-A84A-BF40-233C804452B8}" type="datetimeFigureOut">
               <a:rPr lang="en-US" smtClean="0"/>
-              <a:t>8/15/2018</a:t>
+              <a:t>16/08/18</a:t>
             </a:fld>
             <a:endParaRPr lang="en-US"/>
           </a:p>
@@ -1414,7 +1414,7 @@
           <a:p>
             <a:fld id="{05D66809-10F8-ED4F-BF8F-2BAC7CA4D030}" type="slidenum">
               <a:rPr lang="en-US" smtClean="0"/>
-              <a:t>‹nº›</a:t>
+              <a:t>‹#›</a:t>
             </a:fld>
             <a:endParaRPr lang="en-US"/>
           </a:p>
@@ -1618,7 +1618,7 @@
           <a:p>
             <a:fld id="{767C2E1B-A92C-A84A-BF40-233C804452B8}" type="datetimeFigureOut">
               <a:rPr lang="en-US" smtClean="0"/>
-              <a:t>8/15/2018</a:t>
+              <a:t>16/08/18</a:t>
             </a:fld>
             <a:endParaRPr lang="en-US"/>
           </a:p>
@@ -1660,7 +1660,7 @@
           <a:p>
             <a:fld id="{05D66809-10F8-ED4F-BF8F-2BAC7CA4D030}" type="slidenum">
               <a:rPr lang="en-US" smtClean="0"/>
-              <a:t>‹nº›</a:t>
+              <a:t>‹#›</a:t>
             </a:fld>
             <a:endParaRPr lang="en-US"/>
           </a:p>
@@ -1906,7 +1906,7 @@
           <a:p>
             <a:fld id="{767C2E1B-A92C-A84A-BF40-233C804452B8}" type="datetimeFigureOut">
               <a:rPr lang="en-US" smtClean="0"/>
-              <a:t>8/15/2018</a:t>
+              <a:t>16/08/18</a:t>
             </a:fld>
             <a:endParaRPr lang="en-US"/>
           </a:p>
@@ -1948,7 +1948,7 @@
           <a:p>
             <a:fld id="{05D66809-10F8-ED4F-BF8F-2BAC7CA4D030}" type="slidenum">
               <a:rPr lang="en-US" smtClean="0"/>
-              <a:t>‹nº›</a:t>
+              <a:t>‹#›</a:t>
             </a:fld>
             <a:endParaRPr lang="en-US"/>
           </a:p>
@@ -2328,7 +2328,7 @@
           <a:p>
             <a:fld id="{767C2E1B-A92C-A84A-BF40-233C804452B8}" type="datetimeFigureOut">
               <a:rPr lang="en-US" smtClean="0"/>
-              <a:t>8/15/2018</a:t>
+              <a:t>16/08/18</a:t>
             </a:fld>
             <a:endParaRPr lang="en-US"/>
           </a:p>
@@ -2370,7 +2370,7 @@
           <a:p>
             <a:fld id="{05D66809-10F8-ED4F-BF8F-2BAC7CA4D030}" type="slidenum">
               <a:rPr lang="en-US" smtClean="0"/>
-              <a:t>‹nº›</a:t>
+              <a:t>‹#›</a:t>
             </a:fld>
             <a:endParaRPr lang="en-US"/>
           </a:p>
@@ -2446,7 +2446,7 @@
           <a:p>
             <a:fld id="{767C2E1B-A92C-A84A-BF40-233C804452B8}" type="datetimeFigureOut">
               <a:rPr lang="en-US" smtClean="0"/>
-              <a:t>8/15/2018</a:t>
+              <a:t>16/08/18</a:t>
             </a:fld>
             <a:endParaRPr lang="en-US"/>
           </a:p>
@@ -2488,7 +2488,7 @@
           <a:p>
             <a:fld id="{05D66809-10F8-ED4F-BF8F-2BAC7CA4D030}" type="slidenum">
               <a:rPr lang="en-US" smtClean="0"/>
-              <a:t>‹nº›</a:t>
+              <a:t>‹#›</a:t>
             </a:fld>
             <a:endParaRPr lang="en-US"/>
           </a:p>
@@ -2541,7 +2541,7 @@
           <a:p>
             <a:fld id="{767C2E1B-A92C-A84A-BF40-233C804452B8}" type="datetimeFigureOut">
               <a:rPr lang="en-US" smtClean="0"/>
-              <a:t>8/15/2018</a:t>
+              <a:t>16/08/18</a:t>
             </a:fld>
             <a:endParaRPr lang="en-US"/>
           </a:p>
@@ -2583,7 +2583,7 @@
           <a:p>
             <a:fld id="{05D66809-10F8-ED4F-BF8F-2BAC7CA4D030}" type="slidenum">
               <a:rPr lang="en-US" smtClean="0"/>
-              <a:t>‹nº›</a:t>
+              <a:t>‹#›</a:t>
             </a:fld>
             <a:endParaRPr lang="en-US"/>
           </a:p>
@@ -2818,7 +2818,7 @@
           <a:p>
             <a:fld id="{767C2E1B-A92C-A84A-BF40-233C804452B8}" type="datetimeFigureOut">
               <a:rPr lang="en-US" smtClean="0"/>
-              <a:t>8/15/2018</a:t>
+              <a:t>16/08/18</a:t>
             </a:fld>
             <a:endParaRPr lang="en-US"/>
           </a:p>
@@ -2860,7 +2860,7 @@
           <a:p>
             <a:fld id="{05D66809-10F8-ED4F-BF8F-2BAC7CA4D030}" type="slidenum">
               <a:rPr lang="en-US" smtClean="0"/>
-              <a:t>‹nº›</a:t>
+              <a:t>‹#›</a:t>
             </a:fld>
             <a:endParaRPr lang="en-US"/>
           </a:p>
@@ -3071,7 +3071,7 @@
           <a:p>
             <a:fld id="{767C2E1B-A92C-A84A-BF40-233C804452B8}" type="datetimeFigureOut">
               <a:rPr lang="en-US" smtClean="0"/>
-              <a:t>8/15/2018</a:t>
+              <a:t>16/08/18</a:t>
             </a:fld>
             <a:endParaRPr lang="en-US"/>
           </a:p>
@@ -3113,7 +3113,7 @@
           <a:p>
             <a:fld id="{05D66809-10F8-ED4F-BF8F-2BAC7CA4D030}" type="slidenum">
               <a:rPr lang="en-US" smtClean="0"/>
-              <a:t>‹nº›</a:t>
+              <a:t>‹#›</a:t>
             </a:fld>
             <a:endParaRPr lang="en-US"/>
           </a:p>
@@ -3284,7 +3284,7 @@
           <a:p>
             <a:fld id="{767C2E1B-A92C-A84A-BF40-233C804452B8}" type="datetimeFigureOut">
               <a:rPr lang="en-US" smtClean="0"/>
-              <a:t>8/15/2018</a:t>
+              <a:t>16/08/18</a:t>
             </a:fld>
             <a:endParaRPr lang="en-US"/>
           </a:p>
@@ -3362,7 +3362,7 @@
           <a:p>
             <a:fld id="{05D66809-10F8-ED4F-BF8F-2BAC7CA4D030}" type="slidenum">
               <a:rPr lang="en-US" smtClean="0"/>
-              <a:t>‹nº›</a:t>
+              <a:t>‹#›</a:t>
             </a:fld>
             <a:endParaRPr lang="en-US"/>
           </a:p>
@@ -4000,7 +4000,7 @@
   <p:timing>
     <p:tnLst>
       <p:par>
-        <p:cTn id="1" dur="indefinite" restart="never" nodeType="tmRoot"/>
+        <p:cTn xmlns:p14="http://schemas.microsoft.com/office/powerpoint/2010/main" id="1" dur="indefinite" restart="never" nodeType="tmRoot"/>
       </p:par>
     </p:tnLst>
   </p:timing>
@@ -4545,35 +4545,21 @@
                 <a:latin typeface="Times New Roman"/>
                 <a:cs typeface="Times New Roman"/>
               </a:rPr>
-              <a:t> </a:t>
+              <a:t> e </a:t>
+            </a:r>
+            <a:r>
+              <a:rPr lang="en-US" dirty="0" err="1" smtClean="0">
+                <a:latin typeface="Times New Roman"/>
+                <a:cs typeface="Times New Roman"/>
+              </a:rPr>
+              <a:t>armazenamento</a:t>
             </a:r>
             <a:r>
               <a:rPr lang="en-US" dirty="0" smtClean="0">
                 <a:latin typeface="Times New Roman"/>
                 <a:cs typeface="Times New Roman"/>
               </a:rPr>
-              <a:t>e </a:t>
-            </a:r>
-            <a:r>
-              <a:rPr lang="en-US" dirty="0" err="1" smtClean="0">
-                <a:latin typeface="Times New Roman"/>
-                <a:cs typeface="Times New Roman"/>
-              </a:rPr>
-              <a:t>armazenamento</a:t>
-            </a:r>
-            <a:r>
-              <a:rPr lang="en-US" dirty="0" smtClean="0">
-                <a:latin typeface="Times New Roman"/>
-                <a:cs typeface="Times New Roman"/>
-              </a:rPr>
-              <a:t> dos </a:t>
-            </a:r>
-            <a:r>
-              <a:rPr lang="en-US" dirty="0" smtClean="0">
-                <a:latin typeface="Times New Roman"/>
-                <a:cs typeface="Times New Roman"/>
-              </a:rPr>
-              <a:t>dados;</a:t>
+              <a:t> dos dados;</a:t>
             </a:r>
             <a:endParaRPr lang="en-US" dirty="0">
               <a:latin typeface="Times New Roman"/>
@@ -4595,7 +4581,7 @@
   <p:timing>
     <p:tnLst>
       <p:par>
-        <p:cTn id="1" dur="indefinite" restart="never" nodeType="tmRoot"/>
+        <p:cTn xmlns:p14="http://schemas.microsoft.com/office/powerpoint/2010/main" id="1" dur="indefinite" restart="never" nodeType="tmRoot"/>
       </p:par>
     </p:tnLst>
   </p:timing>
@@ -5237,7 +5223,7 @@
   <p:timing>
     <p:tnLst>
       <p:par>
-        <p:cTn id="1" dur="indefinite" restart="never" nodeType="tmRoot"/>
+        <p:cTn xmlns:p14="http://schemas.microsoft.com/office/powerpoint/2010/main" id="1" dur="indefinite" restart="never" nodeType="tmRoot"/>
       </p:par>
     </p:tnLst>
   </p:timing>
@@ -5919,10 +5905,6 @@
               </a:rPr>
               <a:t> dos dados.</a:t>
             </a:r>
-            <a:endParaRPr lang="en-US" dirty="0">
-              <a:latin typeface="Times New Roman"/>
-              <a:cs typeface="Times New Roman"/>
-            </a:endParaRPr>
           </a:p>
         </p:txBody>
       </p:sp>
@@ -5939,7 +5921,7 @@
   <p:timing>
     <p:tnLst>
       <p:par>
-        <p:cTn id="1" dur="indefinite" restart="never" nodeType="tmRoot"/>
+        <p:cTn xmlns:p14="http://schemas.microsoft.com/office/powerpoint/2010/main" id="1" dur="indefinite" restart="never" nodeType="tmRoot"/>
       </p:par>
     </p:tnLst>
   </p:timing>
@@ -6260,7 +6242,7 @@
   <p:timing>
     <p:tnLst>
       <p:par>
-        <p:cTn id="1" dur="indefinite" restart="never" nodeType="tmRoot"/>
+        <p:cTn xmlns:p14="http://schemas.microsoft.com/office/powerpoint/2010/main" id="1" dur="indefinite" restart="never" nodeType="tmRoot"/>
       </p:par>
     </p:tnLst>
   </p:timing>
@@ -7091,7 +7073,7 @@
   <p:timing>
     <p:tnLst>
       <p:par>
-        <p:cTn id="1" dur="indefinite" restart="never" nodeType="tmRoot"/>
+        <p:cTn xmlns:p14="http://schemas.microsoft.com/office/powerpoint/2010/main" id="1" dur="indefinite" restart="never" nodeType="tmRoot"/>
       </p:par>
     </p:tnLst>
   </p:timing>
@@ -7901,17 +7883,7 @@
                 <a:latin typeface="Times New Roman"/>
                 <a:cs typeface="Times New Roman"/>
               </a:rPr>
-              <a:t>Existem cinco aspectos particularmente marcantes deste </a:t>
-            </a:r>
-            <a:r>
-              <a:rPr lang="x-none" sz="2600" b="1" dirty="0" smtClean="0">
-                <a:solidFill>
-                  <a:srgbClr val="004080"/>
-                </a:solidFill>
-                <a:latin typeface="Times New Roman"/>
-                <a:cs typeface="Times New Roman"/>
-              </a:rPr>
-              <a:t>ciclo</a:t>
+              <a:t>Existem cinco aspectos particularmente marcantes deste ciclo</a:t>
             </a:r>
             <a:r>
               <a:rPr lang="pt-BR" sz="2600" b="1" dirty="0">
@@ -7956,7 +7928,7 @@
   <p:timing>
     <p:tnLst>
       <p:par>
-        <p:cTn id="1" dur="indefinite" restart="never" nodeType="tmRoot"/>
+        <p:cTn xmlns:p14="http://schemas.microsoft.com/office/powerpoint/2010/main" id="1" dur="indefinite" restart="never" nodeType="tmRoot"/>
       </p:par>
     </p:tnLst>
   </p:timing>
@@ -8736,7 +8708,7 @@
   <p:timing>
     <p:tnLst>
       <p:par>
-        <p:cTn id="1" dur="indefinite" restart="never" nodeType="tmRoot"/>
+        <p:cTn xmlns:p14="http://schemas.microsoft.com/office/powerpoint/2010/main" id="1" dur="indefinite" restart="never" nodeType="tmRoot"/>
       </p:par>
     </p:tnLst>
   </p:timing>
@@ -8874,10 +8846,6 @@
               </a:rPr>
               <a:t>Retorne ao seu trio original e troque experiências – 10 minutos.</a:t>
             </a:r>
-            <a:endParaRPr lang="pt-BR" sz="2200" dirty="0" smtClean="0">
-              <a:latin typeface="Times New Roman"/>
-              <a:cs typeface="Times New Roman"/>
-            </a:endParaRPr>
           </a:p>
         </p:txBody>
       </p:sp>
@@ -8941,7 +8909,7 @@
   <p:timing>
     <p:tnLst>
       <p:par>
-        <p:cTn id="1" dur="indefinite" restart="never" nodeType="tmRoot"/>
+        <p:cTn xmlns:p14="http://schemas.microsoft.com/office/powerpoint/2010/main" id="1" dur="indefinite" restart="never" nodeType="tmRoot"/>
       </p:par>
     </p:tnLst>
   </p:timing>
@@ -9072,7 +9040,7 @@
   <p:timing>
     <p:tnLst>
       <p:par>
-        <p:cTn id="1" dur="indefinite" restart="never" nodeType="tmRoot"/>
+        <p:cTn xmlns:p14="http://schemas.microsoft.com/office/powerpoint/2010/main" id="1" dur="indefinite" restart="never" nodeType="tmRoot"/>
       </p:par>
     </p:tnLst>
   </p:timing>
@@ -9112,7 +9080,7 @@
         </p:nvGraphicFramePr>
         <p:xfrm>
           <a:off x="432000" y="1708540"/>
-          <a:ext cx="7292597" cy="1918038"/>
+          <a:ext cx="7292597" cy="2111445"/>
         </p:xfrm>
         <a:graphic>
           <a:graphicData uri="http://schemas.openxmlformats.org/drawingml/2006/table">
@@ -14723,7 +14691,7 @@
   <p:timing>
     <p:tnLst>
       <p:par>
-        <p:cTn id="1" dur="indefinite" restart="never" nodeType="tmRoot"/>
+        <p:cTn xmlns:p14="http://schemas.microsoft.com/office/powerpoint/2010/main" id="1" dur="indefinite" restart="never" nodeType="tmRoot"/>
       </p:par>
     </p:tnLst>
   </p:timing>
@@ -14826,7 +14794,7 @@
           <a:noFill/>
           <a:extLst>
             <a:ext uri="{909E8E84-426E-40dd-AFC4-6F175D3DCCD1}">
-              <a14:hiddenFill xmlns:a14="http://schemas.microsoft.com/office/drawing/2010/main" xmlns="">
+              <a14:hiddenFill xmlns:a14="http://schemas.microsoft.com/office/drawing/2010/main">
                 <a:solidFill>
                   <a:srgbClr val="FFFFFF"/>
                 </a:solidFill>
@@ -15267,7 +15235,7 @@
           <p:nvPr>
             <p:extLst>
               <p:ext uri="{D42A27DB-BD31-4B8C-83A1-F6EECF244321}">
-                <p14:modId xmlns:p14="http://schemas.microsoft.com/office/powerpoint/2010/main" val="3909156388"/>
+                <p14:modId xmlns:p14="http://schemas.microsoft.com/office/powerpoint/2010/main" val="512337520"/>
               </p:ext>
             </p:extLst>
           </p:nvPr>
@@ -15648,7 +15616,7 @@
                         </a:lnSpc>
                       </a:pPr>
                       <a:r>
-                        <a:rPr lang="en-US" sz="2000" b="0" i="0" u="none" strike="noStrike">
+                        <a:rPr lang="en-US" sz="2000" b="0" i="0" u="none" strike="noStrike" dirty="0" smtClean="0">
                           <a:solidFill>
                             <a:srgbClr val="000000"/>
                           </a:solidFill>
@@ -15656,8 +15624,16 @@
                           <a:latin typeface="Times New Roman"/>
                           <a:cs typeface="Times New Roman"/>
                         </a:rPr>
-                        <a:t>v4.long</a:t>
+                        <a:t>v4a</a:t>
                       </a:r>
+                      <a:endParaRPr lang="en-US" sz="2000" b="0" i="0" u="none" strike="noStrike" dirty="0">
+                        <a:solidFill>
+                          <a:srgbClr val="000000"/>
+                        </a:solidFill>
+                        <a:effectLst/>
+                        <a:latin typeface="Times New Roman"/>
+                        <a:cs typeface="Times New Roman"/>
+                      </a:endParaRPr>
                     </a:p>
                   </a:txBody>
                   <a:tcPr marL="12700" marR="12700" marT="12700" marB="0" anchor="ctr">
@@ -15704,7 +15680,7 @@
                         </a:lnSpc>
                       </a:pPr>
                       <a:r>
-                        <a:rPr lang="en-US" sz="2000" b="0" i="0" u="none" strike="noStrike">
+                        <a:rPr lang="en-US" sz="2000" b="0" i="0" u="none" strike="noStrike" dirty="0" smtClean="0">
                           <a:solidFill>
                             <a:srgbClr val="000000"/>
                           </a:solidFill>
@@ -15712,8 +15688,16 @@
                           <a:latin typeface="Times New Roman"/>
                           <a:cs typeface="Times New Roman"/>
                         </a:rPr>
-                        <a:t>v4.lat</a:t>
+                        <a:t>v4b</a:t>
                       </a:r>
+                      <a:endParaRPr lang="en-US" sz="2000" b="0" i="0" u="none" strike="noStrike" dirty="0">
+                        <a:solidFill>
+                          <a:srgbClr val="000000"/>
+                        </a:solidFill>
+                        <a:effectLst/>
+                        <a:latin typeface="Times New Roman"/>
+                        <a:cs typeface="Times New Roman"/>
+                      </a:endParaRPr>
                     </a:p>
                   </a:txBody>
                   <a:tcPr marL="12700" marR="12700" marT="12700" marB="0" anchor="ctr">
@@ -18741,7 +18725,7 @@
   <p:timing>
     <p:tnLst>
       <p:par>
-        <p:cTn id="1" dur="indefinite" restart="never" nodeType="tmRoot"/>
+        <p:cTn xmlns:p14="http://schemas.microsoft.com/office/powerpoint/2010/main" id="1" dur="indefinite" restart="never" nodeType="tmRoot"/>
       </p:par>
     </p:tnLst>
   </p:timing>
@@ -18828,7 +18812,7 @@
         </p:nvGraphicFramePr>
         <p:xfrm>
           <a:off x="-2" y="3700194"/>
-          <a:ext cx="9144002" cy="2565400"/>
+          <a:ext cx="9144002" cy="2565399"/>
         </p:xfrm>
         <a:graphic>
           <a:graphicData uri="http://schemas.openxmlformats.org/drawingml/2006/table">
@@ -19869,7 +19853,7 @@
   <p:timing>
     <p:tnLst>
       <p:par>
-        <p:cTn id="1" dur="indefinite" restart="never" nodeType="tmRoot"/>
+        <p:cTn xmlns:p14="http://schemas.microsoft.com/office/powerpoint/2010/main" id="1" dur="indefinite" restart="never" nodeType="tmRoot"/>
       </p:par>
     </p:tnLst>
   </p:timing>
@@ -20359,13 +20343,13 @@
             <a:p>
               <a:pPr algn="ctr"/>
               <a:r>
-                <a:rPr lang="pt-BR" sz="2200" b="1" dirty="0" smtClean="0">
+                <a:rPr lang="pt-BR" sz="2200" b="1" i="1" dirty="0" smtClean="0">
                   <a:latin typeface="Times New Roman" panose="02020603050405020304" pitchFamily="18" charset="0"/>
                   <a:cs typeface="Times New Roman" panose="02020603050405020304" pitchFamily="18" charset="0"/>
                 </a:rPr>
                 <a:t>Homo sapiens</a:t>
               </a:r>
-              <a:endParaRPr lang="pt-BR" sz="2200" b="1" dirty="0">
+              <a:endParaRPr lang="pt-BR" sz="2200" b="1" i="1" dirty="0">
                 <a:latin typeface="Times New Roman" panose="02020603050405020304" pitchFamily="18" charset="0"/>
                 <a:cs typeface="Times New Roman" panose="02020603050405020304" pitchFamily="18" charset="0"/>
               </a:endParaRPr>
@@ -20396,13 +20380,13 @@
             <a:p>
               <a:pPr algn="ctr"/>
               <a:r>
-                <a:rPr lang="pt-BR" sz="2200" b="1" dirty="0" err="1" smtClean="0">
+                <a:rPr lang="pt-BR" sz="2200" b="1" i="1" dirty="0" err="1" smtClean="0">
                   <a:latin typeface="Times New Roman" panose="02020603050405020304" pitchFamily="18" charset="0"/>
                   <a:cs typeface="Times New Roman" panose="02020603050405020304" pitchFamily="18" charset="0"/>
                 </a:rPr>
                 <a:t>Homo.sapiens</a:t>
               </a:r>
-              <a:endParaRPr lang="pt-BR" sz="2200" b="1" dirty="0">
+              <a:endParaRPr lang="pt-BR" sz="2200" b="1" i="1" dirty="0">
                 <a:latin typeface="Times New Roman" panose="02020603050405020304" pitchFamily="18" charset="0"/>
                 <a:cs typeface="Times New Roman" panose="02020603050405020304" pitchFamily="18" charset="0"/>
               </a:endParaRPr>
@@ -20539,13 +20523,13 @@
             <a:p>
               <a:pPr algn="ctr"/>
               <a:r>
-                <a:rPr lang="pt-BR" sz="2200" b="1" dirty="0" smtClean="0">
+                <a:rPr lang="pt-BR" sz="2200" b="1" i="1" dirty="0" smtClean="0">
                   <a:latin typeface="Times New Roman" panose="02020603050405020304" pitchFamily="18" charset="0"/>
                   <a:cs typeface="Times New Roman" panose="02020603050405020304" pitchFamily="18" charset="0"/>
                 </a:rPr>
                 <a:t>Homo   sapiens</a:t>
               </a:r>
-              <a:endParaRPr lang="pt-BR" sz="2200" b="1" dirty="0">
+              <a:endParaRPr lang="pt-BR" sz="2200" b="1" i="1" dirty="0">
                 <a:latin typeface="Times New Roman" panose="02020603050405020304" pitchFamily="18" charset="0"/>
                 <a:cs typeface="Times New Roman" panose="02020603050405020304" pitchFamily="18" charset="0"/>
               </a:endParaRPr>
@@ -20566,7 +20550,7 @@
   <p:timing>
     <p:tnLst>
       <p:par>
-        <p:cTn id="1" dur="indefinite" restart="never" nodeType="tmRoot"/>
+        <p:cTn xmlns:p14="http://schemas.microsoft.com/office/powerpoint/2010/main" id="1" dur="indefinite" restart="never" nodeType="tmRoot"/>
       </p:par>
     </p:tnLst>
   </p:timing>
@@ -24436,7 +24420,7 @@
   <p:timing>
     <p:tnLst>
       <p:par>
-        <p:cTn id="1" dur="indefinite" restart="never" nodeType="tmRoot"/>
+        <p:cTn xmlns:p14="http://schemas.microsoft.com/office/powerpoint/2010/main" id="1" dur="indefinite" restart="never" nodeType="tmRoot"/>
       </p:par>
     </p:tnLst>
   </p:timing>
@@ -27556,7 +27540,7 @@
   <p:timing>
     <p:tnLst>
       <p:par>
-        <p:cTn id="1" dur="indefinite" restart="never" nodeType="tmRoot"/>
+        <p:cTn xmlns:p14="http://schemas.microsoft.com/office/powerpoint/2010/main" id="1" dur="indefinite" restart="never" nodeType="tmRoot"/>
       </p:par>
     </p:tnLst>
   </p:timing>
@@ -27643,7 +27627,7 @@
         </p:nvGraphicFramePr>
         <p:xfrm>
           <a:off x="1008857" y="969047"/>
-          <a:ext cx="7126286" cy="3113532"/>
+          <a:ext cx="7126286" cy="3113531"/>
         </p:xfrm>
         <a:graphic>
           <a:graphicData uri="http://schemas.openxmlformats.org/drawingml/2006/table">
@@ -32491,7 +32475,7 @@
         </p:nvGraphicFramePr>
         <p:xfrm>
           <a:off x="1180848" y="4756956"/>
-          <a:ext cx="2597441" cy="1709420"/>
+          <a:ext cx="2597441" cy="1709419"/>
         </p:xfrm>
         <a:graphic>
           <a:graphicData uri="http://schemas.openxmlformats.org/drawingml/2006/table">
@@ -33528,7 +33512,7 @@
         </p:nvGraphicFramePr>
         <p:xfrm>
           <a:off x="5338174" y="5189126"/>
-          <a:ext cx="2597441" cy="1367536"/>
+          <a:ext cx="2597441" cy="1367535"/>
         </p:xfrm>
         <a:graphic>
           <a:graphicData uri="http://schemas.openxmlformats.org/drawingml/2006/table">
@@ -34600,7 +34584,7 @@
   <p:timing>
     <p:tnLst>
       <p:par>
-        <p:cTn id="1" dur="indefinite" restart="never" nodeType="tmRoot"/>
+        <p:cTn xmlns:p14="http://schemas.microsoft.com/office/powerpoint/2010/main" id="1" dur="indefinite" restart="never" nodeType="tmRoot"/>
       </p:par>
     </p:tnLst>
   </p:timing>
@@ -35779,7 +35763,7 @@
   <p:timing>
     <p:tnLst>
       <p:par>
-        <p:cTn id="1" dur="indefinite" restart="never" nodeType="tmRoot"/>
+        <p:cTn xmlns:p14="http://schemas.microsoft.com/office/powerpoint/2010/main" id="1" dur="indefinite" restart="never" nodeType="tmRoot"/>
       </p:par>
     </p:tnLst>
   </p:timing>
@@ -37140,7 +37124,7 @@
   <p:timing>
     <p:tnLst>
       <p:par>
-        <p:cTn id="1" dur="indefinite" restart="never" nodeType="tmRoot"/>
+        <p:cTn xmlns:p14="http://schemas.microsoft.com/office/powerpoint/2010/main" id="1" dur="indefinite" restart="never" nodeType="tmRoot"/>
       </p:par>
     </p:tnLst>
   </p:timing>
@@ -37293,21 +37277,7 @@
                 <a:latin typeface="Times New Roman"/>
                 <a:cs typeface="Times New Roman"/>
               </a:rPr>
-              <a:t>Existem alguns hábitos e práticas que, se implementados, podem facilitar </a:t>
-            </a:r>
-            <a:r>
-              <a:rPr lang="pt-BR" sz="2200" dirty="0" smtClean="0">
-                <a:latin typeface="Times New Roman"/>
-                <a:cs typeface="Times New Roman"/>
-              </a:rPr>
-              <a:t>a r</a:t>
-            </a:r>
-            <a:r>
-              <a:rPr lang="pt-BR" sz="2200" dirty="0" smtClean="0">
-                <a:latin typeface="Times New Roman"/>
-                <a:cs typeface="Times New Roman"/>
-              </a:rPr>
-              <a:t>ápida disponibilização e uso dos dados;</a:t>
+              <a:t>Existem alguns hábitos e práticas que, se implementados, podem facilitar a rápida disponibilização e uso dos dados;</a:t>
             </a:r>
           </a:p>
           <a:p>
@@ -37344,7 +37314,7 @@
   <p:timing>
     <p:tnLst>
       <p:par>
-        <p:cTn id="1" dur="indefinite" restart="never" nodeType="tmRoot"/>
+        <p:cTn xmlns:p14="http://schemas.microsoft.com/office/powerpoint/2010/main" id="1" dur="indefinite" restart="never" nodeType="tmRoot"/>
       </p:par>
     </p:tnLst>
   </p:timing>
@@ -37447,7 +37417,7 @@
           <a:noFill/>
           <a:extLst>
             <a:ext uri="{909E8E84-426E-40dd-AFC4-6F175D3DCCD1}">
-              <a14:hiddenFill xmlns:a14="http://schemas.microsoft.com/office/drawing/2010/main" xmlns="">
+              <a14:hiddenFill xmlns:a14="http://schemas.microsoft.com/office/drawing/2010/main">
                 <a:solidFill>
                   <a:srgbClr val="FFFFFF"/>
                 </a:solidFill>
@@ -38107,7 +38077,7 @@
           <a:noFill/>
           <a:extLst>
             <a:ext uri="{909E8E84-426E-40dd-AFC4-6F175D3DCCD1}">
-              <a14:hiddenFill xmlns:a14="http://schemas.microsoft.com/office/drawing/2010/main" xmlns="">
+              <a14:hiddenFill xmlns:a14="http://schemas.microsoft.com/office/drawing/2010/main">
                 <a:solidFill>
                   <a:srgbClr val="FFFFFF"/>
                 </a:solidFill>
@@ -39686,7 +39656,7 @@
   <p:timing>
     <p:tnLst>
       <p:par>
-        <p:cTn id="1" dur="indefinite" restart="never" nodeType="tmRoot"/>
+        <p:cTn xmlns:p14="http://schemas.microsoft.com/office/powerpoint/2010/main" id="1" dur="indefinite" restart="never" nodeType="tmRoot"/>
       </p:par>
     </p:tnLst>
   </p:timing>
@@ -39745,17 +39715,7 @@
                 <a:latin typeface="Times New Roman"/>
                 <a:cs typeface="Times New Roman"/>
               </a:rPr>
-              <a:t>Existe um precipício enorme entre os dados e o que podemos </a:t>
-            </a:r>
-            <a:r>
-              <a:rPr lang="pt-BR" sz="2800" b="1" dirty="0" smtClean="0">
-                <a:solidFill>
-                  <a:srgbClr val="004080"/>
-                </a:solidFill>
-                <a:latin typeface="Times New Roman"/>
-                <a:cs typeface="Times New Roman"/>
-              </a:rPr>
-              <a:t>gerar a partir deles</a:t>
+              <a:t>Existe um precipício enorme entre os dados e o que podemos gerar a partir deles</a:t>
             </a:r>
             <a:endParaRPr lang="pt-BR" sz="2800" b="1" dirty="0">
               <a:solidFill>
@@ -39838,7 +39798,7 @@
   <p:timing>
     <p:tnLst>
       <p:par>
-        <p:cTn id="1" dur="indefinite" restart="never" nodeType="tmRoot"/>
+        <p:cTn xmlns:p14="http://schemas.microsoft.com/office/powerpoint/2010/main" id="1" dur="indefinite" restart="never" nodeType="tmRoot"/>
       </p:par>
     </p:tnLst>
   </p:timing>
@@ -40103,7 +40063,7 @@
   <p:timing>
     <p:tnLst>
       <p:par>
-        <p:cTn id="1" dur="indefinite" restart="never" nodeType="tmRoot"/>
+        <p:cTn xmlns:p14="http://schemas.microsoft.com/office/powerpoint/2010/main" id="1" dur="indefinite" restart="never" nodeType="tmRoot"/>
       </p:par>
     </p:tnLst>
   </p:timing>
@@ -40492,7 +40452,7 @@
   <p:timing>
     <p:tnLst>
       <p:par>
-        <p:cTn id="1" dur="indefinite" restart="never" nodeType="tmRoot"/>
+        <p:cTn xmlns:p14="http://schemas.microsoft.com/office/powerpoint/2010/main" id="1" dur="indefinite" restart="never" nodeType="tmRoot"/>
       </p:par>
     </p:tnLst>
   </p:timing>
@@ -41019,7 +40979,7 @@
   <p:timing>
     <p:tnLst>
       <p:par>
-        <p:cTn id="1" dur="indefinite" restart="never" nodeType="tmRoot"/>
+        <p:cTn xmlns:p14="http://schemas.microsoft.com/office/powerpoint/2010/main" id="1" dur="indefinite" restart="never" nodeType="tmRoot"/>
       </p:par>
     </p:tnLst>
   </p:timing>

</xml_diff>